<commit_message>
some plotting files deleted
</commit_message>
<xml_diff>
--- a/analyses/climatevariability/analyzereservoir/plots_luc_0403.pptx
+++ b/analyses/climatevariability/analyzereservoir/plots_luc_0403.pptx
@@ -4072,13 +4072,9 @@
           <a:p>
             <a:r>
               <a:rPr lang="en-US" dirty="0" smtClean="0"/>
-              <a:t>Not </a:t>
-            </a:r>
-            <a:r>
-              <a:rPr lang="en-US" smtClean="0"/>
-              <a:t>log scale</a:t>
-            </a:r>
-            <a:endParaRPr lang="en-US"/>
+              <a:t>Not log scale</a:t>
+            </a:r>
+            <a:endParaRPr lang="en-US" dirty="0"/>
           </a:p>
         </p:txBody>
       </p:sp>

</xml_diff>